<commit_message>
Update status of QoO
</commit_message>
<xml_diff>
--- a/ietf124-Montreal/Slides/OPS-WG-Updates-IPPM-PERFMETRDIR.pptx
+++ b/ietf124-Montreal/Slides/OPS-WG-Updates-IPPM-PERFMETRDIR.pptx
@@ -116,100 +116,29 @@
 </p:presentation>
 </file>
 
-<file path=ppt/revisionInfo.xml><?xml version="1.0" encoding="utf-8"?>
-<p1510:revInfo xmlns:a="http://schemas.openxmlformats.org/drawingml/2006/main" xmlns:r="http://schemas.openxmlformats.org/officeDocument/2006/relationships" xmlns:p1510="http://schemas.microsoft.com/office/powerpoint/2015/10/main">
-  <p1510:revLst>
-    <p1510:client id="{8EE65B73-EEF7-461B-A304-33F940DBBC49}" v="19" dt="2025-10-27T06:17:11.292"/>
-  </p1510:revLst>
-</p1510:revInfo>
-</file>
-
 <file path=ppt/changesInfos/changesInfo1.xml><?xml version="1.0" encoding="utf-8"?>
 <pc:chgInfo xmlns:a="http://schemas.openxmlformats.org/drawingml/2006/main" xmlns:r="http://schemas.openxmlformats.org/officeDocument/2006/relationships" xmlns:ac="http://schemas.microsoft.com/office/drawing/2013/main/command" xmlns:pc="http://schemas.microsoft.com/office/powerpoint/2013/main/command">
   <pc:docChgLst>
-    <pc:chgData name="Graf Thomas, SCS-INI-NET-VNC-E2E" userId="487bc3e3-9ce7-4cdd-b7b4-8899ea88d289" providerId="ADAL" clId="{8EE65B73-EEF7-461B-A304-33F940DBBC49}"/>
-    <pc:docChg chg="undo custSel modSld">
-      <pc:chgData name="Graf Thomas, SCS-INI-NET-VNC-E2E" userId="487bc3e3-9ce7-4cdd-b7b4-8899ea88d289" providerId="ADAL" clId="{8EE65B73-EEF7-461B-A304-33F940DBBC49}" dt="2025-10-27T07:34:21.828" v="820" actId="20577"/>
+    <pc:chgData name="Marcus Ihlar" userId="3466507a-8f95-47f2-ae1b-ce7d6ca611a4" providerId="ADAL" clId="{3438F4FC-D214-4A35-B915-405844213C8B}"/>
+    <pc:docChg chg="modSld">
+      <pc:chgData name="Marcus Ihlar" userId="3466507a-8f95-47f2-ae1b-ce7d6ca611a4" providerId="ADAL" clId="{3438F4FC-D214-4A35-B915-405844213C8B}" dt="2025-11-04T14:52:31.633" v="8" actId="20577"/>
       <pc:docMkLst>
         <pc:docMk/>
       </pc:docMkLst>
       <pc:sldChg chg="modSp mod">
-        <pc:chgData name="Graf Thomas, SCS-INI-NET-VNC-E2E" userId="487bc3e3-9ce7-4cdd-b7b4-8899ea88d289" providerId="ADAL" clId="{8EE65B73-EEF7-461B-A304-33F940DBBC49}" dt="2025-10-27T06:18:28.957" v="816" actId="20577"/>
-        <pc:sldMkLst>
-          <pc:docMk/>
-          <pc:sldMk cId="132822887" sldId="257"/>
-        </pc:sldMkLst>
-        <pc:spChg chg="mod">
-          <ac:chgData name="Graf Thomas, SCS-INI-NET-VNC-E2E" userId="487bc3e3-9ce7-4cdd-b7b4-8899ea88d289" providerId="ADAL" clId="{8EE65B73-EEF7-461B-A304-33F940DBBC49}" dt="2025-10-27T06:16:28.525" v="786" actId="20577"/>
-          <ac:spMkLst>
-            <pc:docMk/>
-            <pc:sldMk cId="132822887" sldId="257"/>
-            <ac:spMk id="3" creationId="{5082E14F-0499-0D67-CCEB-98C164D73BB5}"/>
-          </ac:spMkLst>
-        </pc:spChg>
-        <pc:spChg chg="mod">
-          <ac:chgData name="Graf Thomas, SCS-INI-NET-VNC-E2E" userId="487bc3e3-9ce7-4cdd-b7b4-8899ea88d289" providerId="ADAL" clId="{8EE65B73-EEF7-461B-A304-33F940DBBC49}" dt="2025-10-27T06:18:28.957" v="816" actId="20577"/>
-          <ac:spMkLst>
-            <pc:docMk/>
-            <pc:sldMk cId="132822887" sldId="257"/>
-            <ac:spMk id="5" creationId="{CBE55EBD-1B16-433A-2B82-E65DC5EA1A56}"/>
-          </ac:spMkLst>
-        </pc:spChg>
-      </pc:sldChg>
-      <pc:sldChg chg="addSp modSp mod">
-        <pc:chgData name="Graf Thomas, SCS-INI-NET-VNC-E2E" userId="487bc3e3-9ce7-4cdd-b7b4-8899ea88d289" providerId="ADAL" clId="{8EE65B73-EEF7-461B-A304-33F940DBBC49}" dt="2025-10-27T07:34:21.828" v="820" actId="20577"/>
+        <pc:chgData name="Marcus Ihlar" userId="3466507a-8f95-47f2-ae1b-ce7d6ca611a4" providerId="ADAL" clId="{3438F4FC-D214-4A35-B915-405844213C8B}" dt="2025-11-04T14:52:31.633" v="8" actId="20577"/>
         <pc:sldMkLst>
           <pc:docMk/>
           <pc:sldMk cId="2180883231" sldId="258"/>
         </pc:sldMkLst>
         <pc:spChg chg="mod">
-          <ac:chgData name="Graf Thomas, SCS-INI-NET-VNC-E2E" userId="487bc3e3-9ce7-4cdd-b7b4-8899ea88d289" providerId="ADAL" clId="{8EE65B73-EEF7-461B-A304-33F940DBBC49}" dt="2025-10-27T05:43:53.355" v="2" actId="108"/>
-          <ac:spMkLst>
-            <pc:docMk/>
-            <pc:sldMk cId="2180883231" sldId="258"/>
-            <ac:spMk id="2" creationId="{6841F4A8-32C7-087F-ADC5-EC992FA45176}"/>
-          </ac:spMkLst>
-        </pc:spChg>
-        <pc:spChg chg="mod">
-          <ac:chgData name="Graf Thomas, SCS-INI-NET-VNC-E2E" userId="487bc3e3-9ce7-4cdd-b7b4-8899ea88d289" providerId="ADAL" clId="{8EE65B73-EEF7-461B-A304-33F940DBBC49}" dt="2025-10-27T07:34:21.828" v="820" actId="20577"/>
+          <ac:chgData name="Marcus Ihlar" userId="3466507a-8f95-47f2-ae1b-ce7d6ca611a4" providerId="ADAL" clId="{3438F4FC-D214-4A35-B915-405844213C8B}" dt="2025-11-04T14:52:31.633" v="8" actId="20577"/>
           <ac:spMkLst>
             <pc:docMk/>
             <pc:sldMk cId="2180883231" sldId="258"/>
             <ac:spMk id="3" creationId="{5082E14F-0499-0D67-CCEB-98C164D73BB5}"/>
           </ac:spMkLst>
         </pc:spChg>
-        <pc:spChg chg="add">
-          <ac:chgData name="Graf Thomas, SCS-INI-NET-VNC-E2E" userId="487bc3e3-9ce7-4cdd-b7b4-8899ea88d289" providerId="ADAL" clId="{8EE65B73-EEF7-461B-A304-33F940DBBC49}" dt="2025-10-27T06:13:26.891" v="614"/>
-          <ac:spMkLst>
-            <pc:docMk/>
-            <pc:sldMk cId="2180883231" sldId="258"/>
-            <ac:spMk id="4" creationId="{CD351CC5-36DF-11C4-7657-5D870E351333}"/>
-          </ac:spMkLst>
-        </pc:spChg>
-        <pc:spChg chg="mod">
-          <ac:chgData name="Graf Thomas, SCS-INI-NET-VNC-E2E" userId="487bc3e3-9ce7-4cdd-b7b4-8899ea88d289" providerId="ADAL" clId="{8EE65B73-EEF7-461B-A304-33F940DBBC49}" dt="2025-10-27T06:18:26.697" v="815" actId="20577"/>
-          <ac:spMkLst>
-            <pc:docMk/>
-            <pc:sldMk cId="2180883231" sldId="258"/>
-            <ac:spMk id="5" creationId="{CBE55EBD-1B16-433A-2B82-E65DC5EA1A56}"/>
-          </ac:spMkLst>
-        </pc:spChg>
-      </pc:sldChg>
-    </pc:docChg>
-  </pc:docChgLst>
-  <pc:docChgLst>
-    <pc:chgData name="Graf Thomas, SCS-INI-NET-VNC-E2E" userId="487bc3e3-9ce7-4cdd-b7b4-8899ea88d289" providerId="ADAL" clId="{C773D143-2CD7-4EAF-9325-16F7FEE25ACD}"/>
-    <pc:docChg chg="modSld">
-      <pc:chgData name="Graf Thomas, SCS-INI-NET-VNC-E2E" userId="487bc3e3-9ce7-4cdd-b7b4-8899ea88d289" providerId="ADAL" clId="{C773D143-2CD7-4EAF-9325-16F7FEE25ACD}" dt="2025-07-14T06:16:52.150" v="0" actId="20577"/>
-      <pc:docMkLst>
-        <pc:docMk/>
-      </pc:docMkLst>
-      <pc:sldChg chg="modSp mod">
-        <pc:chgData name="Graf Thomas, SCS-INI-NET-VNC-E2E" userId="487bc3e3-9ce7-4cdd-b7b4-8899ea88d289" providerId="ADAL" clId="{C773D143-2CD7-4EAF-9325-16F7FEE25ACD}" dt="2025-07-14T06:16:52.150" v="0" actId="20577"/>
-        <pc:sldMkLst>
-          <pc:docMk/>
-          <pc:sldMk cId="2180883231" sldId="258"/>
-        </pc:sldMkLst>
       </pc:sldChg>
     </pc:docChg>
   </pc:docChgLst>
@@ -298,7 +227,7 @@
           <a:p>
             <a:fld id="{993813BE-9644-4EB0-A6C4-0B9517916EF9}" type="datetimeFigureOut">
               <a:rPr lang="fr-FR" smtClean="0"/>
-              <a:t>27/10/2025</a:t>
+              <a:t>04/11/2025</a:t>
             </a:fld>
             <a:endParaRPr lang="fr-FR" dirty="0"/>
           </a:p>
@@ -880,7 +809,7 @@
           <a:p>
             <a:fld id="{AF3A2D09-215D-4610-87DE-176F93FAFFFB}" type="datetime1">
               <a:rPr lang="fr-FR" smtClean="0"/>
-              <a:t>27/10/2025</a:t>
+              <a:t>04/11/2025</a:t>
             </a:fld>
             <a:endParaRPr lang="fr-FR" dirty="0"/>
           </a:p>
@@ -1082,7 +1011,7 @@
           <a:p>
             <a:fld id="{7F2B3DBA-070E-4070-BF49-61ED05E982A8}" type="datetime1">
               <a:rPr lang="fr-FR" smtClean="0"/>
-              <a:t>27/10/2025</a:t>
+              <a:t>04/11/2025</a:t>
             </a:fld>
             <a:endParaRPr lang="fr-FR" dirty="0"/>
           </a:p>
@@ -1294,7 +1223,7 @@
           <a:p>
             <a:fld id="{1861926C-C024-4DC6-8C34-EC76F14394CD}" type="datetime1">
               <a:rPr lang="fr-FR" smtClean="0"/>
-              <a:t>27/10/2025</a:t>
+              <a:t>04/11/2025</a:t>
             </a:fld>
             <a:endParaRPr lang="fr-FR" dirty="0"/>
           </a:p>
@@ -1496,7 +1425,7 @@
           <a:p>
             <a:fld id="{1FEACCCC-DFCC-4756-9119-F1F4182DEE79}" type="datetime1">
               <a:rPr lang="fr-FR" smtClean="0"/>
-              <a:t>27/10/2025</a:t>
+              <a:t>04/11/2025</a:t>
             </a:fld>
             <a:endParaRPr lang="fr-FR" dirty="0"/>
           </a:p>
@@ -1775,7 +1704,7 @@
           <a:p>
             <a:fld id="{F166DA53-6888-4012-9540-B1A2D306F057}" type="datetime1">
               <a:rPr lang="fr-FR" smtClean="0"/>
-              <a:t>27/10/2025</a:t>
+              <a:t>04/11/2025</a:t>
             </a:fld>
             <a:endParaRPr lang="fr-FR" dirty="0"/>
           </a:p>
@@ -2044,7 +1973,7 @@
           <a:p>
             <a:fld id="{B2712EA3-61AF-4B68-96B7-FD0EF5B6D1CF}" type="datetime1">
               <a:rPr lang="fr-FR" smtClean="0"/>
-              <a:t>27/10/2025</a:t>
+              <a:t>04/11/2025</a:t>
             </a:fld>
             <a:endParaRPr lang="fr-FR" dirty="0"/>
           </a:p>
@@ -2460,7 +2389,7 @@
           <a:p>
             <a:fld id="{397F3E34-6190-4D3B-AA13-9C745685F55B}" type="datetime1">
               <a:rPr lang="fr-FR" smtClean="0"/>
-              <a:t>27/10/2025</a:t>
+              <a:t>04/11/2025</a:t>
             </a:fld>
             <a:endParaRPr lang="fr-FR" dirty="0"/>
           </a:p>
@@ -2605,7 +2534,7 @@
           <a:p>
             <a:fld id="{16A0672A-08CA-4958-B194-97B82EC017A1}" type="datetime1">
               <a:rPr lang="fr-FR" smtClean="0"/>
-              <a:t>27/10/2025</a:t>
+              <a:t>04/11/2025</a:t>
             </a:fld>
             <a:endParaRPr lang="fr-FR" dirty="0"/>
           </a:p>
@@ -2722,7 +2651,7 @@
           <a:p>
             <a:fld id="{716B3D01-0A26-4955-A3B9-82886643D6B4}" type="datetime1">
               <a:rPr lang="fr-FR" smtClean="0"/>
-              <a:t>27/10/2025</a:t>
+              <a:t>04/11/2025</a:t>
             </a:fld>
             <a:endParaRPr lang="fr-FR" dirty="0"/>
           </a:p>
@@ -3037,7 +2966,7 @@
           <a:p>
             <a:fld id="{13A4B2D0-68E8-43E1-BC8F-2FA077EAE1FE}" type="datetime1">
               <a:rPr lang="fr-FR" smtClean="0"/>
-              <a:t>27/10/2025</a:t>
+              <a:t>04/11/2025</a:t>
             </a:fld>
             <a:endParaRPr lang="fr-FR" dirty="0"/>
           </a:p>
@@ -3329,7 +3258,7 @@
           <a:p>
             <a:fld id="{631352CE-85DA-4448-A952-A5096EB6C4CB}" type="datetime1">
               <a:rPr lang="fr-FR" smtClean="0"/>
-              <a:t>27/10/2025</a:t>
+              <a:t>04/11/2025</a:t>
             </a:fld>
             <a:endParaRPr lang="fr-FR" dirty="0"/>
           </a:p>
@@ -3574,7 +3503,7 @@
           <a:p>
             <a:fld id="{CBB112E7-EB8B-4390-BCC3-B52E854F5AF2}" type="datetime1">
               <a:rPr lang="fr-FR" smtClean="0"/>
-              <a:t>27/10/2025</a:t>
+              <a:t>04/11/2025</a:t>
             </a:fld>
             <a:endParaRPr lang="fr-FR" dirty="0"/>
           </a:p>
@@ -4049,7 +3978,7 @@
         </p:spPr>
         <p:txBody>
           <a:bodyPr numCol="2">
-            <a:normAutofit fontScale="77500" lnSpcReduction="20000"/>
+            <a:normAutofit fontScale="85000" lnSpcReduction="20000"/>
           </a:bodyPr>
           <a:lstStyle/>
           <a:p>
@@ -4359,11 +4288,11 @@
             </a:r>
             <a:r>
               <a:rPr lang="en-US" b="1" dirty="0"/>
-              <a:t>-ippm-</a:t>
+              <a:t>-</a:t>
             </a:r>
             <a:r>
               <a:rPr lang="en-US" b="1" dirty="0" err="1"/>
-              <a:t>qoo</a:t>
+              <a:t>ippm-qoo</a:t>
             </a:r>
             <a:r>
               <a:rPr lang="en-US" b="1" dirty="0"/>
@@ -4371,7 +4300,15 @@
             </a:r>
             <a:r>
               <a:rPr lang="en-US" dirty="0"/>
-              <a:t>passed working group last call. Shepherd review pending.</a:t>
+              <a:t>passed working group last </a:t>
+            </a:r>
+            <a:r>
+              <a:rPr lang="en-US"/>
+              <a:t>call and submitted </a:t>
+            </a:r>
+            <a:r>
+              <a:rPr lang="en-US" dirty="0"/>
+              <a:t>to IESG.</a:t>
             </a:r>
           </a:p>
           <a:p>
@@ -5484,6 +5421,7 @@
 <file path=docMetadata/LabelInfo.xml><?xml version="1.0" encoding="utf-8"?>
 <clbl:labelList xmlns:clbl="http://schemas.microsoft.com/office/2020/mipLabelMetadata">
   <clbl:label id="{2e1fccfb-80ca-4fe1-a574-1516544edb53}" enabled="1" method="Standard" siteId="{364e5b87-c1c7-420d-9bee-c35d19b557a1}" removed="0"/>
+  <clbl:label id="{92e84ceb-fbfd-47ab-be52-080c6b87953f}" enabled="0" method="" siteId="{92e84ceb-fbfd-47ab-be52-080c6b87953f}" removed="1"/>
   <clbl:label id="{e6c818a6-e1a0-4a6e-a969-20d857c5dc62}" enabled="1" method="Standard" siteId="{90c7a20a-f34b-40bf-bc48-b9253b6f5d20}" removed="0"/>
 </clbl:labelList>
 </file>
</xml_diff>